<commit_message>
minor updates to introduction presentation
</commit_message>
<xml_diff>
--- a/presentations/pptx/00-Introduction.pptx
+++ b/presentations/pptx/00-Introduction.pptx
@@ -228,7 +228,7 @@
           <a:p>
             <a:fld id="{5C93CA8F-50F8-44B5-B48F-4C4452AC4FCB}" type="datetimeFigureOut">
               <a:rPr lang="he-IL" smtClean="0"/>
-              <a:t>כ"ד/ניסן/תשע"ט</a:t>
+              <a:t>ו'/אלול/תשע"ט</a:t>
             </a:fld>
             <a:endParaRPr lang="he-IL"/>
           </a:p>
@@ -1078,7 +1078,7 @@
           <a:p>
             <a:fld id="{808B8BE7-FA93-462E-91E9-54E26C408D98}" type="datetime6">
               <a:rPr lang="en-US" smtClean="0"/>
-              <a:t>April 19</a:t>
+              <a:t>September 19</a:t>
             </a:fld>
             <a:endParaRPr lang="en-US" dirty="0"/>
           </a:p>
@@ -1311,7 +1311,7 @@
           <a:p>
             <a:fld id="{0D82CCDA-FC2D-4BA5-90E3-739DC6ED4C30}" type="datetime6">
               <a:rPr lang="en-US" smtClean="0"/>
-              <a:t>April 19</a:t>
+              <a:t>September 19</a:t>
             </a:fld>
             <a:endParaRPr lang="en-US" dirty="0"/>
           </a:p>
@@ -1490,7 +1490,7 @@
           <a:p>
             <a:fld id="{8F88DA83-5073-4626-B6B8-E91A24F45A53}" type="datetime6">
               <a:rPr lang="en-US" smtClean="0"/>
-              <a:t>April 19</a:t>
+              <a:t>September 19</a:t>
             </a:fld>
             <a:endParaRPr lang="en-US" dirty="0"/>
           </a:p>
@@ -1659,7 +1659,7 @@
           <a:p>
             <a:fld id="{EEBDCC4F-2BAB-4EBD-BBEA-01B8D436681A}" type="datetime6">
               <a:rPr lang="en-US" smtClean="0"/>
-              <a:t>April 19</a:t>
+              <a:t>September 19</a:t>
             </a:fld>
             <a:endParaRPr lang="en-US" dirty="0"/>
           </a:p>
@@ -1983,7 +1983,7 @@
           <a:p>
             <a:fld id="{79487F88-0456-4CDE-8B89-4A78647F618A}" type="datetime6">
               <a:rPr lang="en-US" smtClean="0"/>
-              <a:t>April 19</a:t>
+              <a:t>September 19</a:t>
             </a:fld>
             <a:endParaRPr lang="en-US" dirty="0"/>
           </a:p>
@@ -2433,7 +2433,7 @@
           <a:p>
             <a:fld id="{9136D32D-E4FB-4AA6-8422-EE667E33FFC1}" type="datetime6">
               <a:rPr lang="en-US" smtClean="0"/>
-              <a:t>April 19</a:t>
+              <a:t>September 19</a:t>
             </a:fld>
             <a:endParaRPr lang="en-US" dirty="0"/>
           </a:p>
@@ -2866,7 +2866,7 @@
           <a:p>
             <a:fld id="{3AB3EC8A-F822-46B6-826B-CC266009A74B}" type="datetime6">
               <a:rPr lang="en-US" smtClean="0"/>
-              <a:t>April 19</a:t>
+              <a:t>September 19</a:t>
             </a:fld>
             <a:endParaRPr lang="en-US" dirty="0"/>
           </a:p>
@@ -2983,7 +2983,7 @@
           <a:p>
             <a:fld id="{514A54EB-9E75-485B-93FC-08837C33F6A9}" type="datetime6">
               <a:rPr lang="en-US" smtClean="0"/>
-              <a:t>April 19</a:t>
+              <a:t>September 19</a:t>
             </a:fld>
             <a:endParaRPr lang="en-US" dirty="0"/>
           </a:p>
@@ -3077,7 +3077,7 @@
           <a:p>
             <a:fld id="{4187F57E-3EB2-4425-B7C6-E80F41215C16}" type="datetime6">
               <a:rPr lang="en-US" smtClean="0"/>
-              <a:t>April 19</a:t>
+              <a:t>September 19</a:t>
             </a:fld>
             <a:endParaRPr lang="en-US" dirty="0"/>
           </a:p>
@@ -3426,7 +3426,7 @@
           <a:p>
             <a:fld id="{C0AA945B-18EE-4367-BA0C-8D19048BCABE}" type="datetime6">
               <a:rPr lang="en-US" smtClean="0"/>
-              <a:t>April 19</a:t>
+              <a:t>September 19</a:t>
             </a:fld>
             <a:endParaRPr lang="en-US" dirty="0"/>
           </a:p>
@@ -3914,7 +3914,7 @@
           <a:p>
             <a:fld id="{F5D71FBB-8CD4-4D0A-B8C4-65C60609C705}" type="datetime6">
               <a:rPr lang="en-US" smtClean="0"/>
-              <a:t>April 19</a:t>
+              <a:t>September 19</a:t>
             </a:fld>
             <a:endParaRPr lang="en-US" dirty="0"/>
           </a:p>
@@ -4245,7 +4245,7 @@
           <a:p>
             <a:fld id="{CB7DA022-A739-4269-87CF-EB9B0BE787C4}" type="datetime6">
               <a:rPr lang="en-US" smtClean="0"/>
-              <a:t>April 19</a:t>
+              <a:t>September 19</a:t>
             </a:fld>
             <a:endParaRPr lang="en-US" dirty="0"/>
           </a:p>
@@ -9769,7 +9769,7 @@
             <a:pPr lvl="1"/>
             <a:r>
               <a:rPr lang="en-US" dirty="0"/>
-              <a:t>Functional programming with and iterations with map</a:t>
+              <a:t>Functional programming and iterations with map</a:t>
             </a:r>
           </a:p>
           <a:p>
@@ -9979,7 +9979,7 @@
             <a:pPr lvl="1"/>
             <a:r>
               <a:rPr lang="en-US" dirty="0"/>
-              <a:t>Latest R (3.5.3) – </a:t>
+              <a:t>Latest R (3.6.1) – </a:t>
             </a:r>
             <a:r>
               <a:rPr lang="en-US" dirty="0">
@@ -10265,12 +10265,8 @@
           </a:p>
           <a:p>
             <a:r>
-              <a:rPr lang="en-US" dirty="0" err="1"/>
-              <a:t>RStudio</a:t>
-            </a:r>
-            <a:r>
-              <a:rPr lang="en-US" dirty="0"/>
-              <a:t> </a:t>
+              <a:rPr lang="en-US" dirty="0"/>
+              <a:t>RStudio </a:t>
             </a:r>
             <a:r>
               <a:rPr lang="en-US" dirty="0" err="1"/>
@@ -10278,7 +10274,7 @@
             </a:r>
             <a:r>
               <a:rPr lang="en-US" dirty="0"/>
-              <a:t> (dead tree copies + </a:t>
+              <a:t> (</a:t>
             </a:r>
             <a:r>
               <a:rPr lang="en-US" dirty="0">

</xml_diff>